<commit_message>
Updated slides for session 2 to include more detail exercise about std::stack
</commit_message>
<xml_diff>
--- a/s2/session-2.pptx
+++ b/s2/session-2.pptx
@@ -5,7 +5,7 @@
     <p:sldMasterId id="2147483661" r:id="rId1"/>
   </p:sldMasterIdLst>
   <p:notesMasterIdLst>
-    <p:notesMasterId r:id="rId15"/>
+    <p:notesMasterId r:id="rId20"/>
   </p:notesMasterIdLst>
   <p:sldIdLst>
     <p:sldId id="256" r:id="rId2"/>
@@ -19,8 +19,13 @@
     <p:sldId id="282" r:id="rId10"/>
     <p:sldId id="284" r:id="rId11"/>
     <p:sldId id="280" r:id="rId12"/>
-    <p:sldId id="283" r:id="rId13"/>
-    <p:sldId id="273" r:id="rId14"/>
+    <p:sldId id="285" r:id="rId13"/>
+    <p:sldId id="286" r:id="rId14"/>
+    <p:sldId id="287" r:id="rId15"/>
+    <p:sldId id="288" r:id="rId16"/>
+    <p:sldId id="289" r:id="rId17"/>
+    <p:sldId id="283" r:id="rId18"/>
+    <p:sldId id="273" r:id="rId19"/>
   </p:sldIdLst>
   <p:sldSz cx="9144000" cy="6858000" type="screen4x3"/>
   <p:notesSz cx="6858000" cy="9144000"/>
@@ -4491,7 +4496,7 @@
         <p:spPr/>
         <p:txBody>
           <a:bodyPr>
-            <a:normAutofit lnSpcReduction="10000"/>
+            <a:normAutofit fontScale="92500" lnSpcReduction="10000"/>
           </a:bodyPr>
           <a:lstStyle/>
           <a:p>
@@ -4522,56 +4527,46 @@
             <a:pPr lvl="1"/>
             <a:r>
               <a:rPr lang="pl-PL" dirty="0" smtClean="0"/>
-              <a:t>Spotting race conditions inherent in interfaces (Example: stack)</a:t>
-            </a:r>
-            <a:endParaRPr lang="pl-PL" dirty="0" smtClean="0">
-              <a:solidFill>
-                <a:srgbClr val="FF0000"/>
-              </a:solidFill>
-            </a:endParaRPr>
+              <a:t>Spotting race conditions inherent in interfaces (Example: stack</a:t>
+            </a:r>
+            <a:r>
+              <a:rPr lang="pl-PL" dirty="0" smtClean="0"/>
+              <a:t>)</a:t>
+            </a:r>
           </a:p>
           <a:p>
             <a:pPr lvl="2"/>
             <a:r>
-              <a:rPr lang="pl-PL" u="sng" dirty="0" smtClean="0"/>
-              <a:t>Option 1:</a:t>
-            </a:r>
-            <a:r>
-              <a:rPr lang="pl-PL" dirty="0" smtClean="0"/>
-              <a:t> Pass in a reference </a:t>
+              <a:rPr lang="pl-PL" dirty="0" smtClean="0"/>
+              <a:t>Top()</a:t>
             </a:r>
           </a:p>
           <a:p>
             <a:pPr lvl="2"/>
             <a:r>
-              <a:rPr lang="pl-PL" u="sng" dirty="0" smtClean="0"/>
-              <a:t>Option 2:</a:t>
-            </a:r>
-            <a:r>
-              <a:rPr lang="pl-PL" dirty="0" smtClean="0"/>
-              <a:t> Require a no-throw copy constructor or move constructor </a:t>
+              <a:rPr lang="pl-PL" dirty="0" smtClean="0"/>
+              <a:t>Pop()</a:t>
             </a:r>
           </a:p>
           <a:p>
             <a:pPr lvl="2"/>
             <a:r>
-              <a:rPr lang="pl-PL" u="sng" dirty="0" smtClean="0"/>
-              <a:t>Option 3:</a:t>
-            </a:r>
-            <a:r>
-              <a:rPr lang="pl-PL" dirty="0" smtClean="0"/>
-              <a:t> Return a pointer to the popped item </a:t>
+              <a:rPr lang="pl-PL" dirty="0" smtClean="0"/>
+              <a:t>Push()</a:t>
             </a:r>
           </a:p>
           <a:p>
             <a:pPr lvl="2"/>
             <a:r>
-              <a:rPr lang="pl-PL" u="sng" dirty="0" smtClean="0"/>
-              <a:t>Option 4:</a:t>
-            </a:r>
-            <a:r>
-              <a:rPr lang="pl-PL" dirty="0" smtClean="0"/>
-              <a:t> Provide both option 1 and either 2 or 3 </a:t>
+              <a:rPr lang="pl-PL" dirty="0" smtClean="0"/>
+              <a:t>Empty()</a:t>
+            </a:r>
+          </a:p>
+          <a:p>
+            <a:pPr lvl="2"/>
+            <a:r>
+              <a:rPr lang="pl-PL" dirty="0" smtClean="0"/>
+              <a:t>Size()</a:t>
             </a:r>
           </a:p>
           <a:p>
@@ -4579,9 +4574,13 @@
             <a:endParaRPr lang="pl-PL" dirty="0"/>
           </a:p>
           <a:p>
-            <a:pPr lvl="1"/>
-            <a:r>
-              <a:rPr lang="pl-PL" dirty="0" smtClean="0"/>
+            <a:pPr lvl="2"/>
+            <a:endParaRPr lang="pl-PL" dirty="0"/>
+          </a:p>
+          <a:p>
+            <a:pPr lvl="1"/>
+            <a:r>
+              <a:rPr lang="pl-PL" dirty="0"/>
               <a:t>Example of definition of thread safe stack </a:t>
             </a:r>
             <a:r>
@@ -4598,9 +4597,9 @@
                   <a:srgbClr val="FF0000"/>
                 </a:solidFill>
               </a:rPr>
-              <a:t>s2t13)</a:t>
-            </a:r>
-            <a:endParaRPr lang="pl-PL" dirty="0" smtClean="0"/>
+              <a:t>s2t09)</a:t>
+            </a:r>
+            <a:endParaRPr lang="pl-PL" dirty="0"/>
           </a:p>
         </p:txBody>
       </p:sp>
@@ -4678,6 +4677,1169 @@
           <a:p>
             <a:r>
               <a:rPr lang="pl-PL" dirty="0" smtClean="0"/>
+              <a:t>Top():</a:t>
+            </a:r>
+          </a:p>
+          <a:p>
+            <a:pPr lvl="1"/>
+            <a:r>
+              <a:rPr lang="pl-PL" dirty="0" smtClean="0"/>
+              <a:t>Returning the object: copy or reference?</a:t>
+            </a:r>
+            <a:endParaRPr lang="pl-PL" dirty="0"/>
+          </a:p>
+          <a:p>
+            <a:pPr lvl="1"/>
+            <a:r>
+              <a:rPr lang="pl-PL" dirty="0" smtClean="0"/>
+              <a:t>What about the results of empty() and size()</a:t>
+            </a:r>
+          </a:p>
+          <a:p>
+            <a:pPr lvl="1"/>
+            <a:r>
+              <a:rPr lang="pl-PL" dirty="0" smtClean="0"/>
+              <a:t>What about this code in a shared stack?</a:t>
+            </a:r>
+          </a:p>
+          <a:p>
+            <a:pPr marL="393192" lvl="1" indent="0">
+              <a:buNone/>
+            </a:pPr>
+            <a:endParaRPr lang="pl-PL" sz="2000" dirty="0" smtClean="0">
+              <a:latin typeface="Consolas" panose="020B0609020204030204" pitchFamily="49" charset="0"/>
+              <a:cs typeface="Consolas" panose="020B0609020204030204" pitchFamily="49" charset="0"/>
+            </a:endParaRPr>
+          </a:p>
+          <a:p>
+            <a:pPr marL="640080" lvl="2" indent="0">
+              <a:buNone/>
+            </a:pPr>
+            <a:r>
+              <a:rPr lang="pl-PL" sz="1500" dirty="0">
+                <a:latin typeface="Consolas" panose="020B0609020204030204" pitchFamily="49" charset="0"/>
+                <a:cs typeface="Consolas" panose="020B0609020204030204" pitchFamily="49" charset="0"/>
+              </a:rPr>
+              <a:t>s</a:t>
+            </a:r>
+            <a:r>
+              <a:rPr lang="pl-PL" sz="1500" dirty="0" smtClean="0">
+                <a:latin typeface="Consolas" panose="020B0609020204030204" pitchFamily="49" charset="0"/>
+                <a:cs typeface="Consolas" panose="020B0609020204030204" pitchFamily="49" charset="0"/>
+              </a:rPr>
+              <a:t>td::</a:t>
+            </a:r>
+            <a:r>
+              <a:rPr lang="en-GB" sz="1500" dirty="0" smtClean="0">
+                <a:latin typeface="Consolas" panose="020B0609020204030204" pitchFamily="49" charset="0"/>
+                <a:cs typeface="Consolas" panose="020B0609020204030204" pitchFamily="49" charset="0"/>
+              </a:rPr>
+              <a:t>stack&lt;</a:t>
+            </a:r>
+            <a:r>
+              <a:rPr lang="en-GB" sz="1500" dirty="0" err="1" smtClean="0">
+                <a:latin typeface="Consolas" panose="020B0609020204030204" pitchFamily="49" charset="0"/>
+                <a:cs typeface="Consolas" panose="020B0609020204030204" pitchFamily="49" charset="0"/>
+              </a:rPr>
+              <a:t>int</a:t>
+            </a:r>
+            <a:r>
+              <a:rPr lang="en-GB" sz="1500" dirty="0" smtClean="0">
+                <a:latin typeface="Consolas" panose="020B0609020204030204" pitchFamily="49" charset="0"/>
+                <a:cs typeface="Consolas" panose="020B0609020204030204" pitchFamily="49" charset="0"/>
+              </a:rPr>
+              <a:t>&gt; s;</a:t>
+            </a:r>
+          </a:p>
+          <a:p>
+            <a:pPr marL="640080" lvl="2" indent="0">
+              <a:buNone/>
+            </a:pPr>
+            <a:r>
+              <a:rPr lang="en-GB" sz="1500" dirty="0" smtClean="0">
+                <a:solidFill>
+                  <a:srgbClr val="FF0000"/>
+                </a:solidFill>
+                <a:latin typeface="Consolas" panose="020B0609020204030204" pitchFamily="49" charset="0"/>
+                <a:cs typeface="Consolas" panose="020B0609020204030204" pitchFamily="49" charset="0"/>
+              </a:rPr>
+              <a:t>if(!</a:t>
+            </a:r>
+            <a:r>
+              <a:rPr lang="en-GB" sz="1500" dirty="0" err="1" smtClean="0">
+                <a:solidFill>
+                  <a:srgbClr val="FF0000"/>
+                </a:solidFill>
+                <a:latin typeface="Consolas" panose="020B0609020204030204" pitchFamily="49" charset="0"/>
+                <a:cs typeface="Consolas" panose="020B0609020204030204" pitchFamily="49" charset="0"/>
+              </a:rPr>
+              <a:t>s.empty</a:t>
+            </a:r>
+            <a:r>
+              <a:rPr lang="en-GB" sz="1500" dirty="0" smtClean="0">
+                <a:solidFill>
+                  <a:srgbClr val="FF0000"/>
+                </a:solidFill>
+                <a:latin typeface="Consolas" panose="020B0609020204030204" pitchFamily="49" charset="0"/>
+                <a:cs typeface="Consolas" panose="020B0609020204030204" pitchFamily="49" charset="0"/>
+              </a:rPr>
+              <a:t>()) </a:t>
+            </a:r>
+          </a:p>
+          <a:p>
+            <a:pPr marL="640080" lvl="2" indent="0">
+              <a:buNone/>
+            </a:pPr>
+            <a:r>
+              <a:rPr lang="en-GB" sz="1500" dirty="0" smtClean="0">
+                <a:latin typeface="Consolas" panose="020B0609020204030204" pitchFamily="49" charset="0"/>
+                <a:cs typeface="Consolas" panose="020B0609020204030204" pitchFamily="49" charset="0"/>
+              </a:rPr>
+              <a:t>{</a:t>
+            </a:r>
+          </a:p>
+          <a:p>
+            <a:pPr marL="640080" lvl="2" indent="0">
+              <a:buNone/>
+            </a:pPr>
+            <a:r>
+              <a:rPr lang="pl-PL" sz="1500" dirty="0" smtClean="0">
+                <a:solidFill>
+                  <a:srgbClr val="FF0000"/>
+                </a:solidFill>
+                <a:latin typeface="Consolas" panose="020B0609020204030204" pitchFamily="49" charset="0"/>
+                <a:cs typeface="Consolas" panose="020B0609020204030204" pitchFamily="49" charset="0"/>
+              </a:rPr>
+              <a:t>	</a:t>
+            </a:r>
+            <a:r>
+              <a:rPr lang="en-GB" sz="1500" dirty="0" err="1" smtClean="0">
+                <a:solidFill>
+                  <a:srgbClr val="FF0000"/>
+                </a:solidFill>
+                <a:latin typeface="Consolas" panose="020B0609020204030204" pitchFamily="49" charset="0"/>
+                <a:cs typeface="Consolas" panose="020B0609020204030204" pitchFamily="49" charset="0"/>
+              </a:rPr>
+              <a:t>int</a:t>
+            </a:r>
+            <a:r>
+              <a:rPr lang="en-GB" sz="1500" dirty="0" smtClean="0">
+                <a:solidFill>
+                  <a:srgbClr val="FF0000"/>
+                </a:solidFill>
+                <a:latin typeface="Consolas" panose="020B0609020204030204" pitchFamily="49" charset="0"/>
+                <a:cs typeface="Consolas" panose="020B0609020204030204" pitchFamily="49" charset="0"/>
+              </a:rPr>
+              <a:t> </a:t>
+            </a:r>
+            <a:r>
+              <a:rPr lang="en-GB" sz="1500" dirty="0" err="1" smtClean="0">
+                <a:solidFill>
+                  <a:srgbClr val="FF0000"/>
+                </a:solidFill>
+                <a:latin typeface="Consolas" panose="020B0609020204030204" pitchFamily="49" charset="0"/>
+                <a:cs typeface="Consolas" panose="020B0609020204030204" pitchFamily="49" charset="0"/>
+              </a:rPr>
+              <a:t>const</a:t>
+            </a:r>
+            <a:r>
+              <a:rPr lang="en-GB" sz="1500" dirty="0" smtClean="0">
+                <a:solidFill>
+                  <a:srgbClr val="FF0000"/>
+                </a:solidFill>
+                <a:latin typeface="Consolas" panose="020B0609020204030204" pitchFamily="49" charset="0"/>
+                <a:cs typeface="Consolas" panose="020B0609020204030204" pitchFamily="49" charset="0"/>
+              </a:rPr>
+              <a:t> value</a:t>
+            </a:r>
+            <a:r>
+              <a:rPr lang="pl-PL" sz="1500" dirty="0" smtClean="0">
+                <a:solidFill>
+                  <a:srgbClr val="FF0000"/>
+                </a:solidFill>
+                <a:latin typeface="Consolas" panose="020B0609020204030204" pitchFamily="49" charset="0"/>
+                <a:cs typeface="Consolas" panose="020B0609020204030204" pitchFamily="49" charset="0"/>
+              </a:rPr>
+              <a:t> </a:t>
+            </a:r>
+            <a:r>
+              <a:rPr lang="en-GB" sz="1500" dirty="0" smtClean="0">
+                <a:solidFill>
+                  <a:srgbClr val="FF0000"/>
+                </a:solidFill>
+                <a:latin typeface="Consolas" panose="020B0609020204030204" pitchFamily="49" charset="0"/>
+                <a:cs typeface="Consolas" panose="020B0609020204030204" pitchFamily="49" charset="0"/>
+              </a:rPr>
+              <a:t>=</a:t>
+            </a:r>
+            <a:r>
+              <a:rPr lang="pl-PL" sz="1500" dirty="0" smtClean="0">
+                <a:solidFill>
+                  <a:srgbClr val="FF0000"/>
+                </a:solidFill>
+                <a:latin typeface="Consolas" panose="020B0609020204030204" pitchFamily="49" charset="0"/>
+                <a:cs typeface="Consolas" panose="020B0609020204030204" pitchFamily="49" charset="0"/>
+              </a:rPr>
+              <a:t> </a:t>
+            </a:r>
+            <a:r>
+              <a:rPr lang="en-GB" sz="1500" dirty="0" err="1" smtClean="0">
+                <a:solidFill>
+                  <a:srgbClr val="FF0000"/>
+                </a:solidFill>
+                <a:latin typeface="Consolas" panose="020B0609020204030204" pitchFamily="49" charset="0"/>
+                <a:cs typeface="Consolas" panose="020B0609020204030204" pitchFamily="49" charset="0"/>
+              </a:rPr>
+              <a:t>s.top</a:t>
+            </a:r>
+            <a:r>
+              <a:rPr lang="en-GB" sz="1500" dirty="0" smtClean="0">
+                <a:solidFill>
+                  <a:srgbClr val="FF0000"/>
+                </a:solidFill>
+                <a:latin typeface="Consolas" panose="020B0609020204030204" pitchFamily="49" charset="0"/>
+                <a:cs typeface="Consolas" panose="020B0609020204030204" pitchFamily="49" charset="0"/>
+              </a:rPr>
+              <a:t>(); </a:t>
+            </a:r>
+            <a:r>
+              <a:rPr lang="pl-PL" sz="1500" dirty="0" smtClean="0">
+                <a:solidFill>
+                  <a:srgbClr val="FF0000"/>
+                </a:solidFill>
+                <a:latin typeface="Consolas" panose="020B0609020204030204" pitchFamily="49" charset="0"/>
+                <a:cs typeface="Consolas" panose="020B0609020204030204" pitchFamily="49" charset="0"/>
+              </a:rPr>
+              <a:t>// race #1</a:t>
+            </a:r>
+            <a:endParaRPr lang="en-GB" sz="1500" dirty="0" smtClean="0">
+              <a:solidFill>
+                <a:srgbClr val="FF0000"/>
+              </a:solidFill>
+              <a:latin typeface="Consolas" panose="020B0609020204030204" pitchFamily="49" charset="0"/>
+              <a:cs typeface="Consolas" panose="020B0609020204030204" pitchFamily="49" charset="0"/>
+            </a:endParaRPr>
+          </a:p>
+          <a:p>
+            <a:pPr marL="640080" lvl="2" indent="0">
+              <a:buNone/>
+            </a:pPr>
+            <a:r>
+              <a:rPr lang="pl-PL" sz="1500" dirty="0" smtClean="0">
+                <a:solidFill>
+                  <a:srgbClr val="FF0000"/>
+                </a:solidFill>
+                <a:latin typeface="Consolas" panose="020B0609020204030204" pitchFamily="49" charset="0"/>
+                <a:cs typeface="Consolas" panose="020B0609020204030204" pitchFamily="49" charset="0"/>
+              </a:rPr>
+              <a:t>	</a:t>
+            </a:r>
+            <a:r>
+              <a:rPr lang="en-GB" sz="1500" dirty="0" err="1" smtClean="0">
+                <a:solidFill>
+                  <a:srgbClr val="FF0000"/>
+                </a:solidFill>
+                <a:latin typeface="Consolas" panose="020B0609020204030204" pitchFamily="49" charset="0"/>
+                <a:cs typeface="Consolas" panose="020B0609020204030204" pitchFamily="49" charset="0"/>
+              </a:rPr>
+              <a:t>s.pop</a:t>
+            </a:r>
+            <a:r>
+              <a:rPr lang="en-GB" sz="1500" dirty="0" smtClean="0">
+                <a:solidFill>
+                  <a:srgbClr val="FF0000"/>
+                </a:solidFill>
+                <a:latin typeface="Consolas" panose="020B0609020204030204" pitchFamily="49" charset="0"/>
+                <a:cs typeface="Consolas" panose="020B0609020204030204" pitchFamily="49" charset="0"/>
+              </a:rPr>
+              <a:t>(); </a:t>
+            </a:r>
+            <a:r>
+              <a:rPr lang="pl-PL" sz="1500" dirty="0" smtClean="0">
+                <a:solidFill>
+                  <a:srgbClr val="FF0000"/>
+                </a:solidFill>
+                <a:latin typeface="Consolas" panose="020B0609020204030204" pitchFamily="49" charset="0"/>
+                <a:cs typeface="Consolas" panose="020B0609020204030204" pitchFamily="49" charset="0"/>
+              </a:rPr>
+              <a:t>// race #2</a:t>
+            </a:r>
+            <a:endParaRPr lang="en-GB" sz="1500" dirty="0" smtClean="0">
+              <a:solidFill>
+                <a:srgbClr val="FF0000"/>
+              </a:solidFill>
+              <a:latin typeface="Consolas" panose="020B0609020204030204" pitchFamily="49" charset="0"/>
+              <a:cs typeface="Consolas" panose="020B0609020204030204" pitchFamily="49" charset="0"/>
+            </a:endParaRPr>
+          </a:p>
+          <a:p>
+            <a:pPr marL="640080" lvl="2" indent="0">
+              <a:buNone/>
+            </a:pPr>
+            <a:r>
+              <a:rPr lang="pl-PL" sz="1500" dirty="0" smtClean="0">
+                <a:latin typeface="Consolas" panose="020B0609020204030204" pitchFamily="49" charset="0"/>
+                <a:cs typeface="Consolas" panose="020B0609020204030204" pitchFamily="49" charset="0"/>
+              </a:rPr>
+              <a:t>	</a:t>
+            </a:r>
+            <a:r>
+              <a:rPr lang="en-GB" sz="1500" dirty="0" err="1" smtClean="0">
+                <a:latin typeface="Consolas" panose="020B0609020204030204" pitchFamily="49" charset="0"/>
+                <a:cs typeface="Consolas" panose="020B0609020204030204" pitchFamily="49" charset="0"/>
+              </a:rPr>
+              <a:t>do_something</a:t>
+            </a:r>
+            <a:r>
+              <a:rPr lang="en-GB" sz="1500" dirty="0" smtClean="0">
+                <a:latin typeface="Consolas" panose="020B0609020204030204" pitchFamily="49" charset="0"/>
+                <a:cs typeface="Consolas" panose="020B0609020204030204" pitchFamily="49" charset="0"/>
+              </a:rPr>
+              <a:t>(value);</a:t>
+            </a:r>
+          </a:p>
+          <a:p>
+            <a:pPr marL="640080" lvl="2" indent="0">
+              <a:buNone/>
+            </a:pPr>
+            <a:r>
+              <a:rPr lang="en-GB" sz="1500" dirty="0" smtClean="0">
+                <a:latin typeface="Consolas" panose="020B0609020204030204" pitchFamily="49" charset="0"/>
+                <a:cs typeface="Consolas" panose="020B0609020204030204" pitchFamily="49" charset="0"/>
+              </a:rPr>
+              <a:t>}</a:t>
+            </a:r>
+          </a:p>
+          <a:p>
+            <a:pPr marL="393192" lvl="1" indent="0">
+              <a:buNone/>
+            </a:pPr>
+            <a:endParaRPr lang="pl-PL" dirty="0" smtClean="0"/>
+          </a:p>
+        </p:txBody>
+      </p:sp>
+    </p:spTree>
+    <p:extLst>
+      <p:ext uri="{BB962C8B-B14F-4D97-AF65-F5344CB8AC3E}">
+        <p14:creationId xmlns:p14="http://schemas.microsoft.com/office/powerpoint/2010/main" val="465811319"/>
+      </p:ext>
+    </p:extLst>
+  </p:cSld>
+  <p:clrMapOvr>
+    <a:masterClrMapping/>
+  </p:clrMapOvr>
+</p:sld>
+</file>
+
+<file path=ppt/slides/slide13.xml><?xml version="1.0" encoding="utf-8"?>
+<p:sld xmlns:a="http://schemas.openxmlformats.org/drawingml/2006/main" xmlns:r="http://schemas.openxmlformats.org/officeDocument/2006/relationships" xmlns:p="http://schemas.openxmlformats.org/presentationml/2006/main">
+  <p:cSld>
+    <p:spTree>
+      <p:nvGrpSpPr>
+        <p:cNvPr id="1" name=""/>
+        <p:cNvGrpSpPr/>
+        <p:nvPr/>
+      </p:nvGrpSpPr>
+      <p:grpSpPr>
+        <a:xfrm>
+          <a:off x="0" y="0"/>
+          <a:ext cx="0" cy="0"/>
+          <a:chOff x="0" y="0"/>
+          <a:chExt cx="0" cy="0"/>
+        </a:xfrm>
+      </p:grpSpPr>
+      <p:sp>
+        <p:nvSpPr>
+          <p:cNvPr id="2" name="Title 1"/>
+          <p:cNvSpPr>
+            <a:spLocks noGrp="1"/>
+          </p:cNvSpPr>
+          <p:nvPr>
+            <p:ph type="title"/>
+          </p:nvPr>
+        </p:nvSpPr>
+        <p:spPr/>
+        <p:txBody>
+          <a:bodyPr>
+            <a:normAutofit fontScale="90000"/>
+          </a:bodyPr>
+          <a:lstStyle/>
+          <a:p>
+            <a:r>
+              <a:rPr lang="pl-PL" dirty="0"/>
+              <a:t>Protecting shared data with mutexes</a:t>
+            </a:r>
+            <a:endParaRPr lang="en-GB" dirty="0"/>
+          </a:p>
+        </p:txBody>
+      </p:sp>
+      <p:sp>
+        <p:nvSpPr>
+          <p:cNvPr id="3" name="Content Placeholder 2"/>
+          <p:cNvSpPr>
+            <a:spLocks noGrp="1"/>
+          </p:cNvSpPr>
+          <p:nvPr>
+            <p:ph idx="1"/>
+          </p:nvPr>
+        </p:nvSpPr>
+        <p:spPr/>
+        <p:txBody>
+          <a:bodyPr>
+            <a:normAutofit/>
+          </a:bodyPr>
+          <a:lstStyle/>
+          <a:p>
+            <a:r>
+              <a:rPr lang="pl-PL" dirty="0" smtClean="0"/>
+              <a:t>Possible solution: </a:t>
+            </a:r>
+            <a:r>
+              <a:rPr lang="pl-PL" dirty="0" smtClean="0"/>
+              <a:t>Combine top() + pop()</a:t>
+            </a:r>
+            <a:endParaRPr lang="pl-PL" dirty="0"/>
+          </a:p>
+          <a:p>
+            <a:pPr lvl="1"/>
+            <a:r>
+              <a:rPr lang="pl-PL" u="sng" dirty="0" smtClean="0"/>
+              <a:t>Option 1: Passing a reference:</a:t>
+            </a:r>
+          </a:p>
+          <a:p>
+            <a:pPr marL="640080" lvl="2" indent="0">
+              <a:buNone/>
+            </a:pPr>
+            <a:r>
+              <a:rPr lang="en-GB" sz="1600" dirty="0" err="1">
+                <a:latin typeface="Consolas" panose="020B0609020204030204" pitchFamily="49" charset="0"/>
+                <a:cs typeface="Consolas" panose="020B0609020204030204" pitchFamily="49" charset="0"/>
+              </a:rPr>
+              <a:t>std</a:t>
+            </a:r>
+            <a:r>
+              <a:rPr lang="en-GB" sz="1600" dirty="0">
+                <a:latin typeface="Consolas" panose="020B0609020204030204" pitchFamily="49" charset="0"/>
+                <a:cs typeface="Consolas" panose="020B0609020204030204" pitchFamily="49" charset="0"/>
+              </a:rPr>
+              <a:t>::</a:t>
+            </a:r>
+            <a:r>
+              <a:rPr lang="en-GB" sz="1600" dirty="0" smtClean="0">
+                <a:latin typeface="Consolas" panose="020B0609020204030204" pitchFamily="49" charset="0"/>
+                <a:cs typeface="Consolas" panose="020B0609020204030204" pitchFamily="49" charset="0"/>
+              </a:rPr>
+              <a:t>vector&lt;</a:t>
+            </a:r>
+            <a:r>
+              <a:rPr lang="pl-PL" sz="1600" dirty="0" smtClean="0">
+                <a:latin typeface="Consolas" panose="020B0609020204030204" pitchFamily="49" charset="0"/>
+                <a:cs typeface="Consolas" panose="020B0609020204030204" pitchFamily="49" charset="0"/>
+              </a:rPr>
+              <a:t>T</a:t>
+            </a:r>
+            <a:r>
+              <a:rPr lang="en-GB" sz="1600" dirty="0" smtClean="0">
+                <a:latin typeface="Consolas" panose="020B0609020204030204" pitchFamily="49" charset="0"/>
+                <a:cs typeface="Consolas" panose="020B0609020204030204" pitchFamily="49" charset="0"/>
+              </a:rPr>
+              <a:t>&gt; </a:t>
+            </a:r>
+            <a:r>
+              <a:rPr lang="en-GB" sz="1600" dirty="0">
+                <a:latin typeface="Consolas" panose="020B0609020204030204" pitchFamily="49" charset="0"/>
+                <a:cs typeface="Consolas" panose="020B0609020204030204" pitchFamily="49" charset="0"/>
+              </a:rPr>
+              <a:t>result;</a:t>
+            </a:r>
+          </a:p>
+          <a:p>
+            <a:pPr marL="640080" lvl="2" indent="0">
+              <a:buNone/>
+            </a:pPr>
+            <a:r>
+              <a:rPr lang="en-GB" sz="1600" dirty="0" err="1">
+                <a:latin typeface="Consolas" panose="020B0609020204030204" pitchFamily="49" charset="0"/>
+                <a:cs typeface="Consolas" panose="020B0609020204030204" pitchFamily="49" charset="0"/>
+              </a:rPr>
+              <a:t>some_stack.pop</a:t>
+            </a:r>
+            <a:r>
+              <a:rPr lang="en-GB" sz="1600" dirty="0">
+                <a:latin typeface="Consolas" panose="020B0609020204030204" pitchFamily="49" charset="0"/>
+                <a:cs typeface="Consolas" panose="020B0609020204030204" pitchFamily="49" charset="0"/>
+              </a:rPr>
+              <a:t>(result);</a:t>
+            </a:r>
+          </a:p>
+          <a:p>
+            <a:pPr marL="393192" lvl="1" indent="0">
+              <a:buNone/>
+            </a:pPr>
+            <a:endParaRPr lang="pl-PL" u="sng" dirty="0" smtClean="0"/>
+          </a:p>
+          <a:p>
+            <a:pPr lvl="1"/>
+            <a:r>
+              <a:rPr lang="pl-PL" dirty="0" smtClean="0"/>
+              <a:t>Disadvantages:</a:t>
+            </a:r>
+          </a:p>
+          <a:p>
+            <a:pPr lvl="2"/>
+            <a:endParaRPr lang="pl-PL" dirty="0" smtClean="0"/>
+          </a:p>
+          <a:p>
+            <a:pPr lvl="1"/>
+            <a:endParaRPr lang="pl-PL" dirty="0"/>
+          </a:p>
+          <a:p>
+            <a:pPr lvl="1"/>
+            <a:endParaRPr lang="pl-PL" dirty="0" smtClean="0"/>
+          </a:p>
+          <a:p>
+            <a:pPr lvl="1"/>
+            <a:endParaRPr lang="pl-PL" dirty="0"/>
+          </a:p>
+          <a:p>
+            <a:pPr lvl="1"/>
+            <a:endParaRPr lang="pl-PL" dirty="0" smtClean="0"/>
+          </a:p>
+          <a:p>
+            <a:pPr lvl="1"/>
+            <a:endParaRPr lang="pl-PL" dirty="0"/>
+          </a:p>
+          <a:p>
+            <a:pPr lvl="1"/>
+            <a:endParaRPr lang="pl-PL" dirty="0" smtClean="0"/>
+          </a:p>
+          <a:p>
+            <a:pPr lvl="1"/>
+            <a:endParaRPr lang="pl-PL" dirty="0"/>
+          </a:p>
+        </p:txBody>
+      </p:sp>
+    </p:spTree>
+    <p:extLst>
+      <p:ext uri="{BB962C8B-B14F-4D97-AF65-F5344CB8AC3E}">
+        <p14:creationId xmlns:p14="http://schemas.microsoft.com/office/powerpoint/2010/main" val="4159398508"/>
+      </p:ext>
+    </p:extLst>
+  </p:cSld>
+  <p:clrMapOvr>
+    <a:masterClrMapping/>
+  </p:clrMapOvr>
+</p:sld>
+</file>
+
+<file path=ppt/slides/slide14.xml><?xml version="1.0" encoding="utf-8"?>
+<p:sld xmlns:a="http://schemas.openxmlformats.org/drawingml/2006/main" xmlns:r="http://schemas.openxmlformats.org/officeDocument/2006/relationships" xmlns:p="http://schemas.openxmlformats.org/presentationml/2006/main">
+  <p:cSld>
+    <p:spTree>
+      <p:nvGrpSpPr>
+        <p:cNvPr id="1" name=""/>
+        <p:cNvGrpSpPr/>
+        <p:nvPr/>
+      </p:nvGrpSpPr>
+      <p:grpSpPr>
+        <a:xfrm>
+          <a:off x="0" y="0"/>
+          <a:ext cx="0" cy="0"/>
+          <a:chOff x="0" y="0"/>
+          <a:chExt cx="0" cy="0"/>
+        </a:xfrm>
+      </p:grpSpPr>
+      <p:sp>
+        <p:nvSpPr>
+          <p:cNvPr id="2" name="Title 1"/>
+          <p:cNvSpPr>
+            <a:spLocks noGrp="1"/>
+          </p:cNvSpPr>
+          <p:nvPr>
+            <p:ph type="title"/>
+          </p:nvPr>
+        </p:nvSpPr>
+        <p:spPr/>
+        <p:txBody>
+          <a:bodyPr>
+            <a:normAutofit fontScale="90000"/>
+          </a:bodyPr>
+          <a:lstStyle/>
+          <a:p>
+            <a:r>
+              <a:rPr lang="pl-PL" dirty="0"/>
+              <a:t>Protecting shared data with mutexes</a:t>
+            </a:r>
+            <a:endParaRPr lang="en-GB" dirty="0"/>
+          </a:p>
+        </p:txBody>
+      </p:sp>
+      <p:sp>
+        <p:nvSpPr>
+          <p:cNvPr id="3" name="Content Placeholder 2"/>
+          <p:cNvSpPr>
+            <a:spLocks noGrp="1"/>
+          </p:cNvSpPr>
+          <p:nvPr>
+            <p:ph idx="1"/>
+          </p:nvPr>
+        </p:nvSpPr>
+        <p:spPr/>
+        <p:txBody>
+          <a:bodyPr>
+            <a:normAutofit/>
+          </a:bodyPr>
+          <a:lstStyle/>
+          <a:p>
+            <a:r>
+              <a:rPr lang="pl-PL" dirty="0" smtClean="0"/>
+              <a:t>Possible solution: </a:t>
+            </a:r>
+            <a:r>
+              <a:rPr lang="pl-PL" dirty="0" smtClean="0"/>
+              <a:t>Combine top() + pop()</a:t>
+            </a:r>
+            <a:endParaRPr lang="pl-PL" dirty="0"/>
+          </a:p>
+          <a:p>
+            <a:pPr lvl="1"/>
+            <a:r>
+              <a:rPr lang="pl-PL" u="sng" dirty="0" smtClean="0"/>
+              <a:t>Option 1: Passing a reference:</a:t>
+            </a:r>
+          </a:p>
+          <a:p>
+            <a:pPr marL="640080" lvl="2" indent="0">
+              <a:buNone/>
+            </a:pPr>
+            <a:r>
+              <a:rPr lang="en-GB" sz="1600" dirty="0" err="1">
+                <a:latin typeface="Consolas" panose="020B0609020204030204" pitchFamily="49" charset="0"/>
+                <a:cs typeface="Consolas" panose="020B0609020204030204" pitchFamily="49" charset="0"/>
+              </a:rPr>
+              <a:t>std</a:t>
+            </a:r>
+            <a:r>
+              <a:rPr lang="en-GB" sz="1600" dirty="0">
+                <a:latin typeface="Consolas" panose="020B0609020204030204" pitchFamily="49" charset="0"/>
+                <a:cs typeface="Consolas" panose="020B0609020204030204" pitchFamily="49" charset="0"/>
+              </a:rPr>
+              <a:t>::</a:t>
+            </a:r>
+            <a:r>
+              <a:rPr lang="en-GB" sz="1600" dirty="0" smtClean="0">
+                <a:latin typeface="Consolas" panose="020B0609020204030204" pitchFamily="49" charset="0"/>
+                <a:cs typeface="Consolas" panose="020B0609020204030204" pitchFamily="49" charset="0"/>
+              </a:rPr>
+              <a:t>vector&lt;</a:t>
+            </a:r>
+            <a:r>
+              <a:rPr lang="pl-PL" sz="1600" dirty="0">
+                <a:latin typeface="Consolas" panose="020B0609020204030204" pitchFamily="49" charset="0"/>
+                <a:cs typeface="Consolas" panose="020B0609020204030204" pitchFamily="49" charset="0"/>
+              </a:rPr>
+              <a:t>T</a:t>
+            </a:r>
+            <a:r>
+              <a:rPr lang="en-GB" sz="1600" dirty="0" smtClean="0">
+                <a:latin typeface="Consolas" panose="020B0609020204030204" pitchFamily="49" charset="0"/>
+                <a:cs typeface="Consolas" panose="020B0609020204030204" pitchFamily="49" charset="0"/>
+              </a:rPr>
+              <a:t>&gt; </a:t>
+            </a:r>
+            <a:r>
+              <a:rPr lang="en-GB" sz="1600" dirty="0">
+                <a:latin typeface="Consolas" panose="020B0609020204030204" pitchFamily="49" charset="0"/>
+                <a:cs typeface="Consolas" panose="020B0609020204030204" pitchFamily="49" charset="0"/>
+              </a:rPr>
+              <a:t>result;</a:t>
+            </a:r>
+          </a:p>
+          <a:p>
+            <a:pPr marL="640080" lvl="2" indent="0">
+              <a:buNone/>
+            </a:pPr>
+            <a:r>
+              <a:rPr lang="en-GB" sz="1600" dirty="0" err="1">
+                <a:latin typeface="Consolas" panose="020B0609020204030204" pitchFamily="49" charset="0"/>
+                <a:cs typeface="Consolas" panose="020B0609020204030204" pitchFamily="49" charset="0"/>
+              </a:rPr>
+              <a:t>some_stack.pop</a:t>
+            </a:r>
+            <a:r>
+              <a:rPr lang="en-GB" sz="1600" dirty="0">
+                <a:latin typeface="Consolas" panose="020B0609020204030204" pitchFamily="49" charset="0"/>
+                <a:cs typeface="Consolas" panose="020B0609020204030204" pitchFamily="49" charset="0"/>
+              </a:rPr>
+              <a:t>(result);</a:t>
+            </a:r>
+          </a:p>
+          <a:p>
+            <a:pPr marL="393192" lvl="1" indent="0">
+              <a:buNone/>
+            </a:pPr>
+            <a:endParaRPr lang="pl-PL" u="sng" dirty="0" smtClean="0"/>
+          </a:p>
+          <a:p>
+            <a:pPr lvl="1"/>
+            <a:r>
+              <a:rPr lang="pl-PL" dirty="0" smtClean="0"/>
+              <a:t>Disadvantages:</a:t>
+            </a:r>
+          </a:p>
+          <a:p>
+            <a:pPr lvl="2"/>
+            <a:r>
+              <a:rPr lang="pl-PL" dirty="0" smtClean="0"/>
+              <a:t>Having to construct an instance of the stack’s value prior to the call</a:t>
+            </a:r>
+          </a:p>
+          <a:p>
+            <a:pPr lvl="2"/>
+            <a:r>
+              <a:rPr lang="pl-PL" dirty="0" smtClean="0"/>
+              <a:t>For certain types it can be too expensive</a:t>
+            </a:r>
+          </a:p>
+          <a:p>
+            <a:pPr lvl="2"/>
+            <a:r>
+              <a:rPr lang="pl-PL" dirty="0" smtClean="0"/>
+              <a:t>Some types may not be assignable</a:t>
+            </a:r>
+          </a:p>
+          <a:p>
+            <a:pPr lvl="2"/>
+            <a:endParaRPr lang="pl-PL" dirty="0" smtClean="0"/>
+          </a:p>
+          <a:p>
+            <a:pPr lvl="2"/>
+            <a:endParaRPr lang="pl-PL" dirty="0" smtClean="0"/>
+          </a:p>
+          <a:p>
+            <a:pPr lvl="1"/>
+            <a:endParaRPr lang="pl-PL" dirty="0"/>
+          </a:p>
+          <a:p>
+            <a:pPr lvl="1"/>
+            <a:endParaRPr lang="pl-PL" dirty="0" smtClean="0"/>
+          </a:p>
+          <a:p>
+            <a:pPr lvl="1"/>
+            <a:endParaRPr lang="pl-PL" dirty="0"/>
+          </a:p>
+          <a:p>
+            <a:pPr lvl="1"/>
+            <a:endParaRPr lang="pl-PL" dirty="0" smtClean="0"/>
+          </a:p>
+          <a:p>
+            <a:pPr lvl="1"/>
+            <a:endParaRPr lang="pl-PL" dirty="0"/>
+          </a:p>
+          <a:p>
+            <a:pPr lvl="1"/>
+            <a:endParaRPr lang="pl-PL" dirty="0" smtClean="0"/>
+          </a:p>
+          <a:p>
+            <a:pPr lvl="1"/>
+            <a:endParaRPr lang="pl-PL" dirty="0"/>
+          </a:p>
+        </p:txBody>
+      </p:sp>
+    </p:spTree>
+    <p:extLst>
+      <p:ext uri="{BB962C8B-B14F-4D97-AF65-F5344CB8AC3E}">
+        <p14:creationId xmlns:p14="http://schemas.microsoft.com/office/powerpoint/2010/main" val="3805167292"/>
+      </p:ext>
+    </p:extLst>
+  </p:cSld>
+  <p:clrMapOvr>
+    <a:masterClrMapping/>
+  </p:clrMapOvr>
+</p:sld>
+</file>
+
+<file path=ppt/slides/slide15.xml><?xml version="1.0" encoding="utf-8"?>
+<p:sld xmlns:a="http://schemas.openxmlformats.org/drawingml/2006/main" xmlns:r="http://schemas.openxmlformats.org/officeDocument/2006/relationships" xmlns:p="http://schemas.openxmlformats.org/presentationml/2006/main">
+  <p:cSld>
+    <p:spTree>
+      <p:nvGrpSpPr>
+        <p:cNvPr id="1" name=""/>
+        <p:cNvGrpSpPr/>
+        <p:nvPr/>
+      </p:nvGrpSpPr>
+      <p:grpSpPr>
+        <a:xfrm>
+          <a:off x="0" y="0"/>
+          <a:ext cx="0" cy="0"/>
+          <a:chOff x="0" y="0"/>
+          <a:chExt cx="0" cy="0"/>
+        </a:xfrm>
+      </p:grpSpPr>
+      <p:sp>
+        <p:nvSpPr>
+          <p:cNvPr id="2" name="Title 1"/>
+          <p:cNvSpPr>
+            <a:spLocks noGrp="1"/>
+          </p:cNvSpPr>
+          <p:nvPr>
+            <p:ph type="title"/>
+          </p:nvPr>
+        </p:nvSpPr>
+        <p:spPr/>
+        <p:txBody>
+          <a:bodyPr>
+            <a:normAutofit fontScale="90000"/>
+          </a:bodyPr>
+          <a:lstStyle/>
+          <a:p>
+            <a:r>
+              <a:rPr lang="pl-PL" dirty="0"/>
+              <a:t>Protecting shared data with mutexes</a:t>
+            </a:r>
+            <a:endParaRPr lang="en-GB" dirty="0"/>
+          </a:p>
+        </p:txBody>
+      </p:sp>
+      <p:sp>
+        <p:nvSpPr>
+          <p:cNvPr id="3" name="Content Placeholder 2"/>
+          <p:cNvSpPr>
+            <a:spLocks noGrp="1"/>
+          </p:cNvSpPr>
+          <p:nvPr>
+            <p:ph idx="1"/>
+          </p:nvPr>
+        </p:nvSpPr>
+        <p:spPr/>
+        <p:txBody>
+          <a:bodyPr>
+            <a:normAutofit/>
+          </a:bodyPr>
+          <a:lstStyle/>
+          <a:p>
+            <a:r>
+              <a:rPr lang="pl-PL" dirty="0" smtClean="0"/>
+              <a:t>Possible solution: </a:t>
+            </a:r>
+            <a:r>
+              <a:rPr lang="pl-PL" dirty="0" smtClean="0"/>
+              <a:t>Combine top() + pop()</a:t>
+            </a:r>
+            <a:endParaRPr lang="pl-PL" dirty="0"/>
+          </a:p>
+          <a:p>
+            <a:pPr lvl="1"/>
+            <a:r>
+              <a:rPr lang="pl-PL" u="sng" dirty="0" smtClean="0"/>
+              <a:t>Option 2: Return a pointer to the popped item</a:t>
+            </a:r>
+          </a:p>
+          <a:p>
+            <a:pPr lvl="1"/>
+            <a:endParaRPr lang="pl-PL" u="sng" dirty="0"/>
+          </a:p>
+          <a:p>
+            <a:pPr lvl="1"/>
+            <a:r>
+              <a:rPr lang="pl-PL" dirty="0" smtClean="0"/>
+              <a:t>Advantages:</a:t>
+            </a:r>
+          </a:p>
+          <a:p>
+            <a:pPr lvl="2"/>
+            <a:r>
+              <a:rPr lang="pl-PL" dirty="0" smtClean="0"/>
+              <a:t>Relatively cheap</a:t>
+            </a:r>
+          </a:p>
+          <a:p>
+            <a:pPr lvl="2"/>
+            <a:endParaRPr lang="pl-PL" dirty="0"/>
+          </a:p>
+          <a:p>
+            <a:pPr lvl="1"/>
+            <a:r>
+              <a:rPr lang="pl-PL" dirty="0" smtClean="0"/>
+              <a:t>Disadvantages:</a:t>
+            </a:r>
+          </a:p>
+          <a:p>
+            <a:pPr lvl="2"/>
+            <a:endParaRPr lang="pl-PL" dirty="0" smtClean="0"/>
+          </a:p>
+          <a:p>
+            <a:pPr lvl="2"/>
+            <a:endParaRPr lang="pl-PL" dirty="0" smtClean="0"/>
+          </a:p>
+          <a:p>
+            <a:pPr lvl="1"/>
+            <a:endParaRPr lang="pl-PL" dirty="0"/>
+          </a:p>
+          <a:p>
+            <a:pPr lvl="1"/>
+            <a:endParaRPr lang="pl-PL" dirty="0" smtClean="0"/>
+          </a:p>
+          <a:p>
+            <a:pPr lvl="1"/>
+            <a:endParaRPr lang="pl-PL" dirty="0"/>
+          </a:p>
+          <a:p>
+            <a:pPr lvl="1"/>
+            <a:endParaRPr lang="pl-PL" dirty="0" smtClean="0"/>
+          </a:p>
+          <a:p>
+            <a:pPr lvl="1"/>
+            <a:endParaRPr lang="pl-PL" dirty="0"/>
+          </a:p>
+          <a:p>
+            <a:pPr lvl="1"/>
+            <a:endParaRPr lang="pl-PL" dirty="0" smtClean="0"/>
+          </a:p>
+          <a:p>
+            <a:pPr lvl="1"/>
+            <a:endParaRPr lang="pl-PL" dirty="0"/>
+          </a:p>
+        </p:txBody>
+      </p:sp>
+    </p:spTree>
+    <p:extLst>
+      <p:ext uri="{BB962C8B-B14F-4D97-AF65-F5344CB8AC3E}">
+        <p14:creationId xmlns:p14="http://schemas.microsoft.com/office/powerpoint/2010/main" val="565553777"/>
+      </p:ext>
+    </p:extLst>
+  </p:cSld>
+  <p:clrMapOvr>
+    <a:masterClrMapping/>
+  </p:clrMapOvr>
+</p:sld>
+</file>
+
+<file path=ppt/slides/slide16.xml><?xml version="1.0" encoding="utf-8"?>
+<p:sld xmlns:a="http://schemas.openxmlformats.org/drawingml/2006/main" xmlns:r="http://schemas.openxmlformats.org/officeDocument/2006/relationships" xmlns:p="http://schemas.openxmlformats.org/presentationml/2006/main">
+  <p:cSld>
+    <p:spTree>
+      <p:nvGrpSpPr>
+        <p:cNvPr id="1" name=""/>
+        <p:cNvGrpSpPr/>
+        <p:nvPr/>
+      </p:nvGrpSpPr>
+      <p:grpSpPr>
+        <a:xfrm>
+          <a:off x="0" y="0"/>
+          <a:ext cx="0" cy="0"/>
+          <a:chOff x="0" y="0"/>
+          <a:chExt cx="0" cy="0"/>
+        </a:xfrm>
+      </p:grpSpPr>
+      <p:sp>
+        <p:nvSpPr>
+          <p:cNvPr id="2" name="Title 1"/>
+          <p:cNvSpPr>
+            <a:spLocks noGrp="1"/>
+          </p:cNvSpPr>
+          <p:nvPr>
+            <p:ph type="title"/>
+          </p:nvPr>
+        </p:nvSpPr>
+        <p:spPr/>
+        <p:txBody>
+          <a:bodyPr>
+            <a:normAutofit fontScale="90000"/>
+          </a:bodyPr>
+          <a:lstStyle/>
+          <a:p>
+            <a:r>
+              <a:rPr lang="pl-PL" dirty="0"/>
+              <a:t>Protecting shared data with mutexes</a:t>
+            </a:r>
+            <a:endParaRPr lang="en-GB" dirty="0"/>
+          </a:p>
+        </p:txBody>
+      </p:sp>
+      <p:sp>
+        <p:nvSpPr>
+          <p:cNvPr id="3" name="Content Placeholder 2"/>
+          <p:cNvSpPr>
+            <a:spLocks noGrp="1"/>
+          </p:cNvSpPr>
+          <p:nvPr>
+            <p:ph idx="1"/>
+          </p:nvPr>
+        </p:nvSpPr>
+        <p:spPr/>
+        <p:txBody>
+          <a:bodyPr>
+            <a:normAutofit/>
+          </a:bodyPr>
+          <a:lstStyle/>
+          <a:p>
+            <a:r>
+              <a:rPr lang="pl-PL" dirty="0" smtClean="0"/>
+              <a:t>Possible solution: </a:t>
+            </a:r>
+            <a:r>
+              <a:rPr lang="pl-PL" dirty="0" smtClean="0"/>
+              <a:t>Combine top() + pop()</a:t>
+            </a:r>
+            <a:endParaRPr lang="pl-PL" dirty="0"/>
+          </a:p>
+          <a:p>
+            <a:pPr lvl="1"/>
+            <a:r>
+              <a:rPr lang="pl-PL" u="sng" dirty="0" smtClean="0"/>
+              <a:t>Option 2: Return a pointer to the popped item</a:t>
+            </a:r>
+          </a:p>
+          <a:p>
+            <a:pPr lvl="1"/>
+            <a:endParaRPr lang="pl-PL" u="sng" dirty="0"/>
+          </a:p>
+          <a:p>
+            <a:pPr lvl="1"/>
+            <a:r>
+              <a:rPr lang="pl-PL" dirty="0" smtClean="0"/>
+              <a:t>Advantages:</a:t>
+            </a:r>
+          </a:p>
+          <a:p>
+            <a:pPr lvl="2"/>
+            <a:r>
+              <a:rPr lang="pl-PL" dirty="0" smtClean="0"/>
+              <a:t>Relatively cheap</a:t>
+            </a:r>
+          </a:p>
+          <a:p>
+            <a:pPr lvl="2"/>
+            <a:endParaRPr lang="pl-PL" dirty="0"/>
+          </a:p>
+          <a:p>
+            <a:pPr lvl="1"/>
+            <a:r>
+              <a:rPr lang="pl-PL" dirty="0" smtClean="0"/>
+              <a:t>Disadvantages:</a:t>
+            </a:r>
+          </a:p>
+          <a:p>
+            <a:pPr lvl="2"/>
+            <a:r>
+              <a:rPr lang="pl-PL" dirty="0" smtClean="0"/>
+              <a:t>Having to manage the allocated memory (can be dealt with through std::shared_ptr)</a:t>
+            </a:r>
+          </a:p>
+          <a:p>
+            <a:pPr lvl="2"/>
+            <a:endParaRPr lang="pl-PL" dirty="0" smtClean="0"/>
+          </a:p>
+          <a:p>
+            <a:pPr lvl="2"/>
+            <a:endParaRPr lang="pl-PL" dirty="0" smtClean="0"/>
+          </a:p>
+          <a:p>
+            <a:pPr lvl="1"/>
+            <a:endParaRPr lang="pl-PL" dirty="0"/>
+          </a:p>
+          <a:p>
+            <a:pPr lvl="1"/>
+            <a:endParaRPr lang="pl-PL" dirty="0" smtClean="0"/>
+          </a:p>
+          <a:p>
+            <a:pPr lvl="1"/>
+            <a:endParaRPr lang="pl-PL" dirty="0"/>
+          </a:p>
+          <a:p>
+            <a:pPr lvl="1"/>
+            <a:endParaRPr lang="pl-PL" dirty="0" smtClean="0"/>
+          </a:p>
+          <a:p>
+            <a:pPr lvl="1"/>
+            <a:endParaRPr lang="pl-PL" dirty="0"/>
+          </a:p>
+          <a:p>
+            <a:pPr lvl="1"/>
+            <a:endParaRPr lang="pl-PL" dirty="0" smtClean="0"/>
+          </a:p>
+          <a:p>
+            <a:pPr lvl="1"/>
+            <a:endParaRPr lang="pl-PL" dirty="0"/>
+          </a:p>
+        </p:txBody>
+      </p:sp>
+    </p:spTree>
+    <p:extLst>
+      <p:ext uri="{BB962C8B-B14F-4D97-AF65-F5344CB8AC3E}">
+        <p14:creationId xmlns:p14="http://schemas.microsoft.com/office/powerpoint/2010/main" val="1419295547"/>
+      </p:ext>
+    </p:extLst>
+  </p:cSld>
+  <p:clrMapOvr>
+    <a:masterClrMapping/>
+  </p:clrMapOvr>
+</p:sld>
+</file>
+
+<file path=ppt/slides/slide17.xml><?xml version="1.0" encoding="utf-8"?>
+<p:sld xmlns:a="http://schemas.openxmlformats.org/drawingml/2006/main" xmlns:r="http://schemas.openxmlformats.org/officeDocument/2006/relationships" xmlns:p="http://schemas.openxmlformats.org/presentationml/2006/main">
+  <p:cSld>
+    <p:spTree>
+      <p:nvGrpSpPr>
+        <p:cNvPr id="1" name=""/>
+        <p:cNvGrpSpPr/>
+        <p:nvPr/>
+      </p:nvGrpSpPr>
+      <p:grpSpPr>
+        <a:xfrm>
+          <a:off x="0" y="0"/>
+          <a:ext cx="0" cy="0"/>
+          <a:chOff x="0" y="0"/>
+          <a:chExt cx="0" cy="0"/>
+        </a:xfrm>
+      </p:grpSpPr>
+      <p:sp>
+        <p:nvSpPr>
+          <p:cNvPr id="2" name="Title 1"/>
+          <p:cNvSpPr>
+            <a:spLocks noGrp="1"/>
+          </p:cNvSpPr>
+          <p:nvPr>
+            <p:ph type="title"/>
+          </p:nvPr>
+        </p:nvSpPr>
+        <p:spPr/>
+        <p:txBody>
+          <a:bodyPr>
+            <a:normAutofit fontScale="90000"/>
+          </a:bodyPr>
+          <a:lstStyle/>
+          <a:p>
+            <a:r>
+              <a:rPr lang="pl-PL" dirty="0"/>
+              <a:t>Protecting shared data with mutexes</a:t>
+            </a:r>
+            <a:endParaRPr lang="en-GB" dirty="0"/>
+          </a:p>
+        </p:txBody>
+      </p:sp>
+      <p:sp>
+        <p:nvSpPr>
+          <p:cNvPr id="3" name="Content Placeholder 2"/>
+          <p:cNvSpPr>
+            <a:spLocks noGrp="1"/>
+          </p:cNvSpPr>
+          <p:nvPr>
+            <p:ph idx="1"/>
+          </p:nvPr>
+        </p:nvSpPr>
+        <p:spPr/>
+        <p:txBody>
+          <a:bodyPr>
+            <a:normAutofit/>
+          </a:bodyPr>
+          <a:lstStyle/>
+          <a:p>
+            <a:r>
+              <a:rPr lang="pl-PL" dirty="0" smtClean="0"/>
               <a:t>Summary</a:t>
             </a:r>
           </a:p>
@@ -4751,8 +5913,13 @@
             <a:pPr lvl="1"/>
             <a:r>
               <a:rPr lang="pl-PL" dirty="0" smtClean="0"/>
-              <a:t>Waiting for events</a:t>
-            </a:r>
+              <a:t>Waiting for </a:t>
+            </a:r>
+            <a:r>
+              <a:rPr lang="pl-PL" smtClean="0"/>
+              <a:t>events and using atomics</a:t>
+            </a:r>
+            <a:endParaRPr lang="pl-PL" dirty="0" smtClean="0"/>
           </a:p>
           <a:p>
             <a:pPr lvl="1"/>
@@ -4768,8 +5935,19 @@
                 <a:latin typeface="Consolas" panose="020B0609020204030204" pitchFamily="49" charset="0"/>
                 <a:cs typeface="Consolas" panose="020B0609020204030204" pitchFamily="49" charset="0"/>
               </a:rPr>
-              <a:t>td::future</a:t>
-            </a:r>
+              <a:t>td::</a:t>
+            </a:r>
+            <a:r>
+              <a:rPr lang="pl-PL" dirty="0" smtClean="0">
+                <a:latin typeface="Consolas" panose="020B0609020204030204" pitchFamily="49" charset="0"/>
+                <a:cs typeface="Consolas" panose="020B0609020204030204" pitchFamily="49" charset="0"/>
+              </a:rPr>
+              <a:t>future</a:t>
+            </a:r>
+            <a:endParaRPr lang="pl-PL" dirty="0" smtClean="0">
+              <a:latin typeface="Consolas" panose="020B0609020204030204" pitchFamily="49" charset="0"/>
+              <a:cs typeface="Consolas" panose="020B0609020204030204" pitchFamily="49" charset="0"/>
+            </a:endParaRPr>
           </a:p>
         </p:txBody>
       </p:sp>
@@ -4786,7 +5964,7 @@
 </p:sld>
 </file>
 
-<file path=ppt/slides/slide13.xml><?xml version="1.0" encoding="utf-8"?>
+<file path=ppt/slides/slide18.xml><?xml version="1.0" encoding="utf-8"?>
 <p:sld xmlns:a="http://schemas.openxmlformats.org/drawingml/2006/main" xmlns:r="http://schemas.openxmlformats.org/officeDocument/2006/relationships" xmlns:p="http://schemas.openxmlformats.org/presentationml/2006/main">
   <p:cSld>
     <p:spTree>

</xml_diff>